<commit_message>
Stable before ALTECHS ING presentation
</commit_message>
<xml_diff>
--- a/rapport de stage/Soutenance TAKOUGOUM FOKOU Jacobin Daniel - Présentation.pptx
+++ b/rapport de stage/Soutenance TAKOUGOUM FOKOU Jacobin Daniel - Présentation.pptx
@@ -894,7 +894,7 @@
             <a:fld id="{B61BEF0D-F0BB-DE4B-95CE-6DB70DBA9567}" type="datetimeFigureOut">
               <a:rPr lang="en-US" dirty="0"/>
               <a:pPr/>
-              <a:t>6/12/2020</a:t>
+              <a:t>6/15/2020</a:t>
             </a:fld>
             <a:endParaRPr lang="en-US" dirty="0"/>
           </a:p>
@@ -1142,7 +1142,7 @@
             <a:fld id="{B61BEF0D-F0BB-DE4B-95CE-6DB70DBA9567}" type="datetimeFigureOut">
               <a:rPr lang="en-US" dirty="0"/>
               <a:pPr/>
-              <a:t>6/12/2020</a:t>
+              <a:t>6/15/2020</a:t>
             </a:fld>
             <a:endParaRPr lang="en-US" dirty="0"/>
           </a:p>
@@ -1453,7 +1453,7 @@
             <a:fld id="{B61BEF0D-F0BB-DE4B-95CE-6DB70DBA9567}" type="datetimeFigureOut">
               <a:rPr lang="en-US" dirty="0"/>
               <a:pPr/>
-              <a:t>6/12/2020</a:t>
+              <a:t>6/15/2020</a:t>
             </a:fld>
             <a:endParaRPr lang="en-US" dirty="0"/>
           </a:p>
@@ -1777,7 +1777,7 @@
             <a:fld id="{B61BEF0D-F0BB-DE4B-95CE-6DB70DBA9567}" type="datetimeFigureOut">
               <a:rPr lang="en-US" dirty="0"/>
               <a:pPr/>
-              <a:t>6/12/2020</a:t>
+              <a:t>6/15/2020</a:t>
             </a:fld>
             <a:endParaRPr lang="en-US" dirty="0"/>
           </a:p>
@@ -2088,7 +2088,7 @@
             <a:fld id="{B61BEF0D-F0BB-DE4B-95CE-6DB70DBA9567}" type="datetimeFigureOut">
               <a:rPr lang="en-US" dirty="0"/>
               <a:pPr/>
-              <a:t>6/12/2020</a:t>
+              <a:t>6/15/2020</a:t>
             </a:fld>
             <a:endParaRPr lang="en-US" dirty="0"/>
           </a:p>
@@ -2472,7 +2472,7 @@
             <a:fld id="{B61BEF0D-F0BB-DE4B-95CE-6DB70DBA9567}" type="datetimeFigureOut">
               <a:rPr lang="en-US" dirty="0"/>
               <a:pPr/>
-              <a:t>6/12/2020</a:t>
+              <a:t>6/15/2020</a:t>
             </a:fld>
             <a:endParaRPr lang="en-US" dirty="0"/>
           </a:p>
@@ -2639,7 +2639,7 @@
             <a:fld id="{55C6B4A9-1611-4792-9094-5F34BCA07E0B}" type="datetimeFigureOut">
               <a:rPr lang="en-US" dirty="0"/>
               <a:pPr/>
-              <a:t>6/12/2020</a:t>
+              <a:t>6/15/2020</a:t>
             </a:fld>
             <a:endParaRPr lang="en-US" dirty="0"/>
           </a:p>
@@ -2816,7 +2816,7 @@
             <a:fld id="{B61BEF0D-F0BB-DE4B-95CE-6DB70DBA9567}" type="datetimeFigureOut">
               <a:rPr lang="en-US" dirty="0"/>
               <a:pPr/>
-              <a:t>6/12/2020</a:t>
+              <a:t>6/15/2020</a:t>
             </a:fld>
             <a:endParaRPr lang="en-US" dirty="0"/>
           </a:p>
@@ -2989,7 +2989,7 @@
             <a:fld id="{B61BEF0D-F0BB-DE4B-95CE-6DB70DBA9567}" type="datetimeFigureOut">
               <a:rPr lang="en-US" dirty="0"/>
               <a:pPr/>
-              <a:t>6/12/2020</a:t>
+              <a:t>6/15/2020</a:t>
             </a:fld>
             <a:endParaRPr lang="en-US" dirty="0"/>
           </a:p>
@@ -3233,7 +3233,7 @@
             <a:fld id="{B61BEF0D-F0BB-DE4B-95CE-6DB70DBA9567}" type="datetimeFigureOut">
               <a:rPr lang="en-US" dirty="0"/>
               <a:pPr/>
-              <a:t>6/12/2020</a:t>
+              <a:t>6/15/2020</a:t>
             </a:fld>
             <a:endParaRPr lang="en-US" dirty="0"/>
           </a:p>
@@ -3462,7 +3462,7 @@
             <a:fld id="{EB712588-04B1-427B-82EE-E8DB90309F08}" type="datetimeFigureOut">
               <a:rPr lang="en-US" dirty="0"/>
               <a:pPr/>
-              <a:t>6/12/2020</a:t>
+              <a:t>6/15/2020</a:t>
             </a:fld>
             <a:endParaRPr lang="en-US" dirty="0"/>
           </a:p>
@@ -3833,7 +3833,7 @@
             <a:fld id="{B61BEF0D-F0BB-DE4B-95CE-6DB70DBA9567}" type="datetimeFigureOut">
               <a:rPr lang="en-US" dirty="0"/>
               <a:pPr/>
-              <a:t>6/12/2020</a:t>
+              <a:t>6/15/2020</a:t>
             </a:fld>
             <a:endParaRPr lang="en-US" dirty="0"/>
           </a:p>
@@ -3953,7 +3953,7 @@
             <a:fld id="{B61BEF0D-F0BB-DE4B-95CE-6DB70DBA9567}" type="datetimeFigureOut">
               <a:rPr lang="en-US" dirty="0"/>
               <a:pPr/>
-              <a:t>6/12/2020</a:t>
+              <a:t>6/15/2020</a:t>
             </a:fld>
             <a:endParaRPr lang="en-US" dirty="0"/>
           </a:p>
@@ -4045,7 +4045,7 @@
             <a:fld id="{B61BEF0D-F0BB-DE4B-95CE-6DB70DBA9567}" type="datetimeFigureOut">
               <a:rPr lang="en-US" dirty="0"/>
               <a:pPr/>
-              <a:t>6/12/2020</a:t>
+              <a:t>6/15/2020</a:t>
             </a:fld>
             <a:endParaRPr lang="en-US" dirty="0"/>
           </a:p>
@@ -4297,7 +4297,7 @@
             <a:fld id="{42A54C80-263E-416B-A8E0-580EDEADCBDC}" type="datetimeFigureOut">
               <a:rPr lang="en-US" dirty="0"/>
               <a:pPr/>
-              <a:t>6/12/2020</a:t>
+              <a:t>6/15/2020</a:t>
             </a:fld>
             <a:endParaRPr lang="en-US" dirty="0"/>
           </a:p>
@@ -4557,7 +4557,7 @@
             <a:fld id="{B61BEF0D-F0BB-DE4B-95CE-6DB70DBA9567}" type="datetimeFigureOut">
               <a:rPr lang="en-US" dirty="0"/>
               <a:pPr/>
-              <a:t>6/12/2020</a:t>
+              <a:t>6/15/2020</a:t>
             </a:fld>
             <a:endParaRPr lang="en-US" dirty="0"/>
           </a:p>
@@ -5314,7 +5314,7 @@
             <a:fld id="{B61BEF0D-F0BB-DE4B-95CE-6DB70DBA9567}" type="datetimeFigureOut">
               <a:rPr lang="en-US" dirty="0"/>
               <a:pPr/>
-              <a:t>6/12/2020</a:t>
+              <a:t>6/15/2020</a:t>
             </a:fld>
             <a:endParaRPr lang="en-US" dirty="0"/>
           </a:p>
@@ -5948,8 +5948,8 @@
         </p:nvSpPr>
         <p:spPr>
           <a:xfrm>
-            <a:off x="481566" y="4994728"/>
-            <a:ext cx="11710433" cy="1292662"/>
+            <a:off x="491066" y="5061635"/>
+            <a:ext cx="11700933" cy="1292662"/>
           </a:xfrm>
           <a:prstGeom prst="rect">
             <a:avLst/>
@@ -6031,18 +6031,7 @@
                   </a:schemeClr>
                 </a:solidFill>
               </a:rPr>
-              <a:t> </a:t>
-            </a:r>
-            <a:r>
-              <a:rPr lang="fr-CM" dirty="0" smtClean="0">
-                <a:solidFill>
-                  <a:schemeClr val="accent1">
-                    <a:lumMod val="20000"/>
-                    <a:lumOff val="80000"/>
-                  </a:schemeClr>
-                </a:solidFill>
-              </a:rPr>
-              <a:t>Corporation</a:t>
+              <a:t> Corporation</a:t>
             </a:r>
           </a:p>
           <a:p>
@@ -6463,35 +6452,105 @@
             </a:lvl9pPr>
           </a:lstStyle>
           <a:p>
-            <a:pPr marR="0" lvl="0" indent="0" fontAlgn="auto">
+            <a:pPr marL="0" marR="0" lvl="0" indent="0" algn="l" defTabSz="457200" rtl="0" eaLnBrk="1" fontAlgn="auto" latinLnBrk="0" hangingPunct="1">
               <a:lnSpc>
                 <a:spcPct val="100000"/>
               </a:lnSpc>
+              <a:spcBef>
+                <a:spcPct val="0"/>
+              </a:spcBef>
               <a:spcAft>
                 <a:spcPts val="0"/>
               </a:spcAft>
               <a:buClrTx/>
               <a:buSzTx/>
+              <a:buFontTx/>
+              <a:buNone/>
               <a:tabLst/>
               <a:defRPr/>
             </a:pPr>
             <a:r>
-              <a:rPr lang="en-US" dirty="0" err="1"/>
+              <a:rPr kumimoji="0" lang="en-US" sz="3600" b="0" i="0" u="none" strike="noStrike" kern="1200" cap="none" spc="0" normalizeH="0" baseline="0" noProof="0" dirty="0" err="1">
+                <a:ln>
+                  <a:noFill/>
+                </a:ln>
+                <a:solidFill>
+                  <a:srgbClr val="90C226"/>
+                </a:solidFill>
+                <a:effectLst/>
+                <a:uLnTx/>
+                <a:uFillTx/>
+                <a:latin typeface="Trebuchet MS" panose="020B0603020202020204"/>
+                <a:ea typeface="+mj-ea"/>
+                <a:cs typeface="+mj-cs"/>
+              </a:rPr>
               <a:t>Présentation</a:t>
             </a:r>
             <a:r>
-              <a:rPr lang="en-US" dirty="0"/>
+              <a:rPr kumimoji="0" lang="en-US" sz="3600" b="0" i="0" u="none" strike="noStrike" kern="1200" cap="none" spc="0" normalizeH="0" baseline="0" noProof="0" dirty="0">
+                <a:ln>
+                  <a:noFill/>
+                </a:ln>
+                <a:solidFill>
+                  <a:srgbClr val="90C226"/>
+                </a:solidFill>
+                <a:effectLst/>
+                <a:uLnTx/>
+                <a:uFillTx/>
+                <a:latin typeface="Trebuchet MS" panose="020B0603020202020204"/>
+                <a:ea typeface="+mj-ea"/>
+                <a:cs typeface="+mj-cs"/>
+              </a:rPr>
               <a:t> </a:t>
             </a:r>
             <a:r>
-              <a:rPr lang="en-US" dirty="0"/>
+              <a:rPr kumimoji="0" lang="en-US" sz="3600" b="0" i="0" u="none" strike="noStrike" kern="1200" cap="none" spc="0" normalizeH="0" baseline="0" noProof="0" dirty="0" smtClean="0">
+                <a:ln>
+                  <a:noFill/>
+                </a:ln>
+                <a:solidFill>
+                  <a:srgbClr val="90C226"/>
+                </a:solidFill>
+                <a:effectLst/>
+                <a:uLnTx/>
+                <a:uFillTx/>
+                <a:latin typeface="Trebuchet MS" panose="020B0603020202020204"/>
+                <a:ea typeface="+mj-ea"/>
+                <a:cs typeface="+mj-cs"/>
+              </a:rPr>
               <a:t>du </a:t>
             </a:r>
             <a:r>
-              <a:rPr lang="en-US" dirty="0" err="1"/>
+              <a:rPr kumimoji="0" lang="en-US" sz="3600" b="0" i="0" u="none" strike="noStrike" kern="1200" cap="none" spc="0" normalizeH="0" baseline="0" noProof="0" dirty="0" err="1" smtClean="0">
+                <a:ln>
+                  <a:noFill/>
+                </a:ln>
+                <a:solidFill>
+                  <a:srgbClr val="90C226"/>
+                </a:solidFill>
+                <a:effectLst/>
+                <a:uLnTx/>
+                <a:uFillTx/>
+                <a:latin typeface="Trebuchet MS" panose="020B0603020202020204"/>
+                <a:ea typeface="+mj-ea"/>
+                <a:cs typeface="+mj-cs"/>
+              </a:rPr>
               <a:t>projet</a:t>
             </a:r>
-            <a:endParaRPr lang="en-US" dirty="0"/>
+            <a:endParaRPr kumimoji="0" lang="en-US" sz="3600" b="0" i="0" u="none" strike="noStrike" kern="1200" cap="none" spc="0" normalizeH="0" baseline="0" noProof="0" dirty="0">
+              <a:ln>
+                <a:noFill/>
+              </a:ln>
+              <a:solidFill>
+                <a:srgbClr val="90C226"/>
+              </a:solidFill>
+              <a:effectLst/>
+              <a:uLnTx/>
+              <a:uFillTx/>
+              <a:latin typeface="Trebuchet MS" panose="020B0603020202020204"/>
+              <a:ea typeface="+mj-ea"/>
+              <a:cs typeface="+mj-cs"/>
+            </a:endParaRPr>
           </a:p>
         </p:txBody>
       </p:sp>
@@ -6500,13 +6559,6 @@
   <p:clrMapOvr>
     <a:masterClrMapping/>
   </p:clrMapOvr>
-  <p:timing>
-    <p:tnLst>
-      <p:par>
-        <p:cTn id="1" dur="indefinite" restart="never" nodeType="tmRoot"/>
-      </p:par>
-    </p:tnLst>
-  </p:timing>
 </p:sld>
 </file>
 
@@ -7959,16 +8011,6 @@
             </a:r>
           </a:p>
           <a:p>
-            <a:pPr marL="985838">
-              <a:buNone/>
-            </a:pPr>
-            <a:r>
-              <a:rPr lang="fr-CM" sz="1200" dirty="0"/>
-              <a:t>Création: 2016 suite par M. TSE Martial et M. TEUNKAM Steve Ruben</a:t>
-            </a:r>
-            <a:endParaRPr lang="en-US" sz="1200" dirty="0"/>
-          </a:p>
-          <a:p>
             <a:pPr marL="985838" lvl="0">
               <a:buNone/>
             </a:pPr>
@@ -7978,11 +8020,7 @@
             </a:r>
             <a:r>
               <a:rPr lang="nl-NL" sz="1200" dirty="0" smtClean="0"/>
-              <a:t> </a:t>
-            </a:r>
-            <a:r>
-              <a:rPr lang="nl-NL" sz="1200" dirty="0" smtClean="0"/>
-              <a:t>de </a:t>
+              <a:t> de </a:t>
             </a:r>
             <a:r>
               <a:rPr lang="nl-NL" sz="1200" dirty="0" err="1" smtClean="0"/>
@@ -7998,13 +8036,31 @@
             </a:r>
             <a:r>
               <a:rPr lang="nl-NL" sz="1200" dirty="0" smtClean="0"/>
-              <a:t> de logiciels, </a:t>
+              <a:t> de </a:t>
+            </a:r>
+            <a:r>
+              <a:rPr lang="nl-NL" sz="1200" dirty="0" err="1" smtClean="0"/>
+              <a:t>logiciels</a:t>
+            </a:r>
+            <a:r>
+              <a:rPr lang="nl-NL" sz="1200" dirty="0" smtClean="0"/>
+              <a:t>, </a:t>
             </a:r>
             <a:r>
               <a:rPr lang="nl-NL" sz="1200" dirty="0" err="1" smtClean="0"/>
               <a:t>formation</a:t>
             </a:r>
             <a:endParaRPr lang="nl-NL" sz="1200" dirty="0" smtClean="0"/>
+          </a:p>
+          <a:p>
+            <a:pPr marL="985838" lvl="0">
+              <a:buNone/>
+            </a:pPr>
+            <a:r>
+              <a:rPr lang="fr-CM" sz="1200" dirty="0" smtClean="0"/>
+              <a:t>Création: 2016 suite par M. TSE Martial et M. TEUNKAM Steve Ruben</a:t>
+            </a:r>
+            <a:endParaRPr lang="en-US" sz="1200" dirty="0" smtClean="0"/>
           </a:p>
           <a:p>
             <a:pPr marL="627063" lvl="0" indent="0">
@@ -8205,26 +8261,104 @@
               <a:defRPr/>
             </a:pPr>
             <a:r>
-              <a:rPr lang="en-US" dirty="0" err="1"/>
+              <a:rPr kumimoji="0" lang="en-US" sz="3600" b="0" i="0" u="none" strike="noStrike" kern="1200" cap="none" spc="0" normalizeH="0" baseline="0" noProof="0" dirty="0" err="1">
+                <a:ln>
+                  <a:noFill/>
+                </a:ln>
+                <a:solidFill>
+                  <a:srgbClr val="90C226"/>
+                </a:solidFill>
+                <a:effectLst/>
+                <a:uLnTx/>
+                <a:uFillTx/>
+                <a:latin typeface="Trebuchet MS" panose="020B0603020202020204"/>
+                <a:ea typeface="+mj-ea"/>
+                <a:cs typeface="+mj-cs"/>
+              </a:rPr>
               <a:t>Présentation</a:t>
             </a:r>
             <a:r>
-              <a:rPr lang="en-US" dirty="0"/>
+              <a:rPr kumimoji="0" lang="en-US" sz="3600" b="0" i="0" u="none" strike="noStrike" kern="1200" cap="none" spc="0" normalizeH="0" baseline="0" noProof="0" dirty="0">
+                <a:ln>
+                  <a:noFill/>
+                </a:ln>
+                <a:solidFill>
+                  <a:srgbClr val="90C226"/>
+                </a:solidFill>
+                <a:effectLst/>
+                <a:uLnTx/>
+                <a:uFillTx/>
+                <a:latin typeface="Trebuchet MS" panose="020B0603020202020204"/>
+                <a:ea typeface="+mj-ea"/>
+                <a:cs typeface="+mj-cs"/>
+              </a:rPr>
               <a:t> de </a:t>
             </a:r>
             <a:r>
-              <a:rPr lang="en-US" dirty="0" err="1"/>
+              <a:rPr kumimoji="0" lang="en-US" sz="3600" b="0" i="0" u="none" strike="noStrike" kern="1200" cap="none" spc="0" normalizeH="0" baseline="0" noProof="0" dirty="0" err="1">
+                <a:ln>
+                  <a:noFill/>
+                </a:ln>
+                <a:solidFill>
+                  <a:srgbClr val="90C226"/>
+                </a:solidFill>
+                <a:effectLst/>
+                <a:uLnTx/>
+                <a:uFillTx/>
+                <a:latin typeface="Trebuchet MS" panose="020B0603020202020204"/>
+                <a:ea typeface="+mj-ea"/>
+                <a:cs typeface="+mj-cs"/>
+              </a:rPr>
               <a:t>l’entreprise</a:t>
             </a:r>
             <a:r>
-              <a:rPr lang="en-US" dirty="0"/>
+              <a:rPr kumimoji="0" lang="en-US" sz="3600" b="0" i="0" u="none" strike="noStrike" kern="1200" cap="none" spc="0" normalizeH="0" baseline="0" noProof="0" dirty="0">
+                <a:ln>
+                  <a:noFill/>
+                </a:ln>
+                <a:solidFill>
+                  <a:srgbClr val="90C226"/>
+                </a:solidFill>
+                <a:effectLst/>
+                <a:uLnTx/>
+                <a:uFillTx/>
+                <a:latin typeface="Trebuchet MS" panose="020B0603020202020204"/>
+                <a:ea typeface="+mj-ea"/>
+                <a:cs typeface="+mj-cs"/>
+              </a:rPr>
               <a:t> </a:t>
             </a:r>
             <a:r>
-              <a:rPr lang="en-US" dirty="0" err="1"/>
+              <a:rPr kumimoji="0" lang="en-US" sz="3600" b="0" i="0" u="none" strike="noStrike" kern="1200" cap="none" spc="0" normalizeH="0" baseline="0" noProof="0" dirty="0" err="1" smtClean="0">
+                <a:ln>
+                  <a:noFill/>
+                </a:ln>
+                <a:solidFill>
+                  <a:srgbClr val="90C226"/>
+                </a:solidFill>
+                <a:effectLst/>
+                <a:uLnTx/>
+                <a:uFillTx/>
+                <a:latin typeface="Trebuchet MS" panose="020B0603020202020204"/>
+                <a:ea typeface="+mj-ea"/>
+                <a:cs typeface="+mj-cs"/>
+              </a:rPr>
               <a:t>d’accueil</a:t>
             </a:r>
-            <a:endParaRPr lang="en-US" dirty="0"/>
+            <a:endParaRPr kumimoji="0" lang="en-US" sz="3600" b="0" i="0" u="none" strike="noStrike" kern="1200" cap="none" spc="0" normalizeH="0" baseline="0" noProof="0" dirty="0">
+              <a:ln>
+                <a:noFill/>
+              </a:ln>
+              <a:solidFill>
+                <a:srgbClr val="90C226"/>
+              </a:solidFill>
+              <a:effectLst/>
+              <a:uLnTx/>
+              <a:uFillTx/>
+              <a:latin typeface="Trebuchet MS" panose="020B0603020202020204"/>
+              <a:ea typeface="+mj-ea"/>
+              <a:cs typeface="+mj-cs"/>
+            </a:endParaRPr>
           </a:p>
         </p:txBody>
       </p:sp>
@@ -8866,34 +9000,59 @@
             </a:lvl9pPr>
           </a:lstStyle>
           <a:p>
-            <a:pPr>
-              <a:defRPr/>
-            </a:pPr>
-            <a:r>
-              <a:rPr lang="en-US" dirty="0" err="1"/>
+            <a:r>
+              <a:rPr lang="en-US" dirty="0" err="1" smtClean="0">
+                <a:solidFill>
+                  <a:srgbClr val="90C226"/>
+                </a:solidFill>
+              </a:rPr>
               <a:t>Présentation</a:t>
             </a:r>
             <a:r>
-              <a:rPr lang="en-US" dirty="0"/>
+              <a:rPr lang="en-US" dirty="0" smtClean="0">
+                <a:solidFill>
+                  <a:srgbClr val="90C226"/>
+                </a:solidFill>
+              </a:rPr>
               <a:t> </a:t>
             </a:r>
             <a:r>
-              <a:rPr lang="en-US" dirty="0"/>
+              <a:rPr lang="en-US" dirty="0">
+                <a:solidFill>
+                  <a:srgbClr val="90C226"/>
+                </a:solidFill>
+              </a:rPr>
               <a:t>de </a:t>
             </a:r>
             <a:r>
-              <a:rPr lang="en-US" dirty="0" err="1"/>
+              <a:rPr lang="en-US" dirty="0" err="1">
+                <a:solidFill>
+                  <a:srgbClr val="90C226"/>
+                </a:solidFill>
+              </a:rPr>
               <a:t>l’entreprise</a:t>
             </a:r>
             <a:r>
-              <a:rPr lang="en-US" dirty="0"/>
+              <a:rPr lang="en-US" dirty="0">
+                <a:solidFill>
+                  <a:srgbClr val="90C226"/>
+                </a:solidFill>
+              </a:rPr>
               <a:t> </a:t>
             </a:r>
             <a:r>
-              <a:rPr lang="en-US" dirty="0" err="1"/>
+              <a:rPr lang="en-US" dirty="0" err="1">
+                <a:solidFill>
+                  <a:srgbClr val="90C226"/>
+                </a:solidFill>
+              </a:rPr>
               <a:t>d’accueil</a:t>
             </a:r>
-            <a:endParaRPr lang="en-US" dirty="0"/>
+            <a:endParaRPr lang="en-US" dirty="0">
+              <a:solidFill>
+                <a:srgbClr val="90C226"/>
+              </a:solidFill>
+            </a:endParaRPr>
           </a:p>
           <a:p>
             <a:pPr marL="0" marR="0" lvl="0" indent="0" algn="l" defTabSz="457200" rtl="0" eaLnBrk="1" fontAlgn="auto" latinLnBrk="0" hangingPunct="1">
@@ -9314,10 +9473,18 @@
               <a:defRPr/>
             </a:pPr>
             <a:r>
-              <a:rPr lang="en-US" dirty="0" err="1"/>
+              <a:rPr lang="en-US" dirty="0" err="1" smtClean="0">
+                <a:solidFill>
+                  <a:srgbClr val="90C226"/>
+                </a:solidFill>
+              </a:rPr>
               <a:t>Problématique</a:t>
             </a:r>
-            <a:endParaRPr lang="en-US" dirty="0"/>
+            <a:endParaRPr lang="en-US" dirty="0">
+              <a:solidFill>
+                <a:srgbClr val="90C226"/>
+              </a:solidFill>
+            </a:endParaRPr>
           </a:p>
         </p:txBody>
       </p:sp>
@@ -9809,35 +9976,105 @@
             </a:lvl9pPr>
           </a:lstStyle>
           <a:p>
-            <a:pPr marR="0" indent="0" fontAlgn="auto">
+            <a:pPr marL="0" marR="0" lvl="0" indent="0" algn="l" defTabSz="457200" rtl="0" eaLnBrk="1" fontAlgn="auto" latinLnBrk="0" hangingPunct="1">
               <a:lnSpc>
                 <a:spcPct val="100000"/>
               </a:lnSpc>
+              <a:spcBef>
+                <a:spcPct val="0"/>
+              </a:spcBef>
               <a:spcAft>
                 <a:spcPts val="0"/>
               </a:spcAft>
               <a:buClrTx/>
               <a:buSzTx/>
+              <a:buFontTx/>
+              <a:buNone/>
               <a:tabLst/>
               <a:defRPr/>
             </a:pPr>
             <a:r>
-              <a:rPr lang="en-US" dirty="0" err="1"/>
+              <a:rPr kumimoji="0" lang="en-US" sz="3600" b="0" i="0" u="none" strike="noStrike" kern="1200" cap="none" spc="0" normalizeH="0" baseline="0" noProof="0" dirty="0" err="1">
+                <a:ln>
+                  <a:noFill/>
+                </a:ln>
+                <a:solidFill>
+                  <a:srgbClr val="90C226"/>
+                </a:solidFill>
+                <a:effectLst/>
+                <a:uLnTx/>
+                <a:uFillTx/>
+                <a:latin typeface="Trebuchet MS" panose="020B0603020202020204"/>
+                <a:ea typeface="+mj-ea"/>
+                <a:cs typeface="+mj-cs"/>
+              </a:rPr>
               <a:t>Présentation</a:t>
             </a:r>
             <a:r>
-              <a:rPr lang="en-US" dirty="0"/>
+              <a:rPr kumimoji="0" lang="en-US" sz="3600" b="0" i="0" u="none" strike="noStrike" kern="1200" cap="none" spc="0" normalizeH="0" baseline="0" noProof="0" dirty="0">
+                <a:ln>
+                  <a:noFill/>
+                </a:ln>
+                <a:solidFill>
+                  <a:srgbClr val="90C226"/>
+                </a:solidFill>
+                <a:effectLst/>
+                <a:uLnTx/>
+                <a:uFillTx/>
+                <a:latin typeface="Trebuchet MS" panose="020B0603020202020204"/>
+                <a:ea typeface="+mj-ea"/>
+                <a:cs typeface="+mj-cs"/>
+              </a:rPr>
               <a:t> </a:t>
             </a:r>
             <a:r>
-              <a:rPr lang="en-US" dirty="0"/>
+              <a:rPr kumimoji="0" lang="en-US" sz="3600" b="0" i="0" u="none" strike="noStrike" kern="1200" cap="none" spc="0" normalizeH="0" baseline="0" noProof="0" dirty="0" smtClean="0">
+                <a:ln>
+                  <a:noFill/>
+                </a:ln>
+                <a:solidFill>
+                  <a:srgbClr val="90C226"/>
+                </a:solidFill>
+                <a:effectLst/>
+                <a:uLnTx/>
+                <a:uFillTx/>
+                <a:latin typeface="Trebuchet MS" panose="020B0603020202020204"/>
+                <a:ea typeface="+mj-ea"/>
+                <a:cs typeface="+mj-cs"/>
+              </a:rPr>
               <a:t>du </a:t>
             </a:r>
             <a:r>
-              <a:rPr lang="en-US" dirty="0" err="1"/>
+              <a:rPr kumimoji="0" lang="en-US" sz="3600" b="0" i="0" u="none" strike="noStrike" kern="1200" cap="none" spc="0" normalizeH="0" baseline="0" noProof="0" dirty="0" err="1" smtClean="0">
+                <a:ln>
+                  <a:noFill/>
+                </a:ln>
+                <a:solidFill>
+                  <a:srgbClr val="90C226"/>
+                </a:solidFill>
+                <a:effectLst/>
+                <a:uLnTx/>
+                <a:uFillTx/>
+                <a:latin typeface="Trebuchet MS" panose="020B0603020202020204"/>
+                <a:ea typeface="+mj-ea"/>
+                <a:cs typeface="+mj-cs"/>
+              </a:rPr>
               <a:t>projet</a:t>
             </a:r>
-            <a:endParaRPr lang="en-US" dirty="0"/>
+            <a:endParaRPr kumimoji="0" lang="en-US" sz="3600" b="0" i="0" u="none" strike="noStrike" kern="1200" cap="none" spc="0" normalizeH="0" baseline="0" noProof="0" dirty="0">
+              <a:ln>
+                <a:noFill/>
+              </a:ln>
+              <a:solidFill>
+                <a:srgbClr val="90C226"/>
+              </a:solidFill>
+              <a:effectLst/>
+              <a:uLnTx/>
+              <a:uFillTx/>
+              <a:latin typeface="Trebuchet MS" panose="020B0603020202020204"/>
+              <a:ea typeface="+mj-ea"/>
+              <a:cs typeface="+mj-cs"/>
+            </a:endParaRPr>
           </a:p>
         </p:txBody>
       </p:sp>
@@ -10363,22 +10600,87 @@
               <a:defRPr/>
             </a:pPr>
             <a:r>
-              <a:rPr lang="en-US" dirty="0" err="1"/>
+              <a:rPr kumimoji="0" lang="en-US" sz="3600" b="0" i="0" u="none" strike="noStrike" kern="1200" cap="none" spc="0" normalizeH="0" baseline="0" noProof="0" dirty="0" err="1">
+                <a:ln>
+                  <a:noFill/>
+                </a:ln>
+                <a:solidFill>
+                  <a:srgbClr val="90C226"/>
+                </a:solidFill>
+                <a:effectLst/>
+                <a:uLnTx/>
+                <a:uFillTx/>
+                <a:latin typeface="Trebuchet MS" panose="020B0603020202020204"/>
+                <a:ea typeface="+mj-ea"/>
+                <a:cs typeface="+mj-cs"/>
+              </a:rPr>
               <a:t>Présentation</a:t>
             </a:r>
             <a:r>
-              <a:rPr lang="en-US" dirty="0"/>
+              <a:rPr kumimoji="0" lang="en-US" sz="3600" b="0" i="0" u="none" strike="noStrike" kern="1200" cap="none" spc="0" normalizeH="0" baseline="0" noProof="0" dirty="0">
+                <a:ln>
+                  <a:noFill/>
+                </a:ln>
+                <a:solidFill>
+                  <a:srgbClr val="90C226"/>
+                </a:solidFill>
+                <a:effectLst/>
+                <a:uLnTx/>
+                <a:uFillTx/>
+                <a:latin typeface="Trebuchet MS" panose="020B0603020202020204"/>
+                <a:ea typeface="+mj-ea"/>
+                <a:cs typeface="+mj-cs"/>
+              </a:rPr>
               <a:t> </a:t>
             </a:r>
             <a:r>
-              <a:rPr lang="en-US" dirty="0"/>
+              <a:rPr kumimoji="0" lang="en-US" sz="3600" b="0" i="0" u="none" strike="noStrike" kern="1200" cap="none" spc="0" normalizeH="0" baseline="0" noProof="0" dirty="0" smtClean="0">
+                <a:ln>
+                  <a:noFill/>
+                </a:ln>
+                <a:solidFill>
+                  <a:srgbClr val="90C226"/>
+                </a:solidFill>
+                <a:effectLst/>
+                <a:uLnTx/>
+                <a:uFillTx/>
+                <a:latin typeface="Trebuchet MS" panose="020B0603020202020204"/>
+                <a:ea typeface="+mj-ea"/>
+                <a:cs typeface="+mj-cs"/>
+              </a:rPr>
               <a:t>du </a:t>
             </a:r>
             <a:r>
-              <a:rPr lang="en-US" dirty="0" err="1"/>
+              <a:rPr kumimoji="0" lang="en-US" sz="3600" b="0" i="0" u="none" strike="noStrike" kern="1200" cap="none" spc="0" normalizeH="0" baseline="0" noProof="0" dirty="0" err="1" smtClean="0">
+                <a:ln>
+                  <a:noFill/>
+                </a:ln>
+                <a:solidFill>
+                  <a:srgbClr val="90C226"/>
+                </a:solidFill>
+                <a:effectLst/>
+                <a:uLnTx/>
+                <a:uFillTx/>
+                <a:latin typeface="Trebuchet MS" panose="020B0603020202020204"/>
+                <a:ea typeface="+mj-ea"/>
+                <a:cs typeface="+mj-cs"/>
+              </a:rPr>
               <a:t>projet</a:t>
             </a:r>
-            <a:endParaRPr lang="en-US" dirty="0"/>
+            <a:endParaRPr kumimoji="0" lang="en-US" sz="3600" b="0" i="0" u="none" strike="noStrike" kern="1200" cap="none" spc="0" normalizeH="0" baseline="0" noProof="0" dirty="0">
+              <a:ln>
+                <a:noFill/>
+              </a:ln>
+              <a:solidFill>
+                <a:srgbClr val="90C226"/>
+              </a:solidFill>
+              <a:effectLst/>
+              <a:uLnTx/>
+              <a:uFillTx/>
+              <a:latin typeface="Trebuchet MS" panose="020B0603020202020204"/>
+              <a:ea typeface="+mj-ea"/>
+              <a:cs typeface="+mj-cs"/>
+            </a:endParaRPr>
           </a:p>
         </p:txBody>
       </p:sp>
@@ -10858,26 +11160,105 @@
             </a:lvl9pPr>
           </a:lstStyle>
           <a:p>
-            <a:pPr>
+            <a:pPr marL="0" marR="0" lvl="0" indent="0" algn="l" defTabSz="457200" rtl="0" eaLnBrk="1" fontAlgn="auto" latinLnBrk="0" hangingPunct="1">
+              <a:lnSpc>
+                <a:spcPct val="100000"/>
+              </a:lnSpc>
+              <a:spcBef>
+                <a:spcPct val="0"/>
+              </a:spcBef>
+              <a:spcAft>
+                <a:spcPts val="0"/>
+              </a:spcAft>
+              <a:buClrTx/>
+              <a:buSzTx/>
+              <a:buFontTx/>
+              <a:buNone/>
+              <a:tabLst/>
               <a:defRPr/>
             </a:pPr>
             <a:r>
-              <a:rPr lang="en-US" dirty="0" err="1"/>
+              <a:rPr kumimoji="0" lang="en-US" sz="3600" b="0" i="0" u="none" strike="noStrike" kern="1200" cap="none" spc="0" normalizeH="0" baseline="0" noProof="0" dirty="0" err="1">
+                <a:ln>
+                  <a:noFill/>
+                </a:ln>
+                <a:solidFill>
+                  <a:srgbClr val="90C226"/>
+                </a:solidFill>
+                <a:effectLst/>
+                <a:uLnTx/>
+                <a:uFillTx/>
+                <a:latin typeface="Trebuchet MS" panose="020B0603020202020204"/>
+                <a:ea typeface="+mj-ea"/>
+                <a:cs typeface="+mj-cs"/>
+              </a:rPr>
               <a:t>Présentation</a:t>
             </a:r>
             <a:r>
-              <a:rPr lang="en-US" dirty="0"/>
+              <a:rPr kumimoji="0" lang="en-US" sz="3600" b="0" i="0" u="none" strike="noStrike" kern="1200" cap="none" spc="0" normalizeH="0" baseline="0" noProof="0" dirty="0">
+                <a:ln>
+                  <a:noFill/>
+                </a:ln>
+                <a:solidFill>
+                  <a:srgbClr val="90C226"/>
+                </a:solidFill>
+                <a:effectLst/>
+                <a:uLnTx/>
+                <a:uFillTx/>
+                <a:latin typeface="Trebuchet MS" panose="020B0603020202020204"/>
+                <a:ea typeface="+mj-ea"/>
+                <a:cs typeface="+mj-cs"/>
+              </a:rPr>
               <a:t> </a:t>
             </a:r>
             <a:r>
-              <a:rPr lang="en-US" dirty="0"/>
+              <a:rPr kumimoji="0" lang="en-US" sz="3600" b="0" i="0" u="none" strike="noStrike" kern="1200" cap="none" spc="0" normalizeH="0" baseline="0" noProof="0" dirty="0" smtClean="0">
+                <a:ln>
+                  <a:noFill/>
+                </a:ln>
+                <a:solidFill>
+                  <a:srgbClr val="90C226"/>
+                </a:solidFill>
+                <a:effectLst/>
+                <a:uLnTx/>
+                <a:uFillTx/>
+                <a:latin typeface="Trebuchet MS" panose="020B0603020202020204"/>
+                <a:ea typeface="+mj-ea"/>
+                <a:cs typeface="+mj-cs"/>
+              </a:rPr>
               <a:t>du </a:t>
             </a:r>
             <a:r>
-              <a:rPr lang="en-US" dirty="0" err="1"/>
+              <a:rPr kumimoji="0" lang="en-US" sz="3600" b="0" i="0" u="none" strike="noStrike" kern="1200" cap="none" spc="0" normalizeH="0" baseline="0" noProof="0" dirty="0" err="1" smtClean="0">
+                <a:ln>
+                  <a:noFill/>
+                </a:ln>
+                <a:solidFill>
+                  <a:srgbClr val="90C226"/>
+                </a:solidFill>
+                <a:effectLst/>
+                <a:uLnTx/>
+                <a:uFillTx/>
+                <a:latin typeface="Trebuchet MS" panose="020B0603020202020204"/>
+                <a:ea typeface="+mj-ea"/>
+                <a:cs typeface="+mj-cs"/>
+              </a:rPr>
               <a:t>projet</a:t>
             </a:r>
-            <a:endParaRPr lang="en-US" dirty="0"/>
+            <a:endParaRPr kumimoji="0" lang="en-US" sz="3600" b="0" i="0" u="none" strike="noStrike" kern="1200" cap="none" spc="0" normalizeH="0" baseline="0" noProof="0" dirty="0">
+              <a:ln>
+                <a:noFill/>
+              </a:ln>
+              <a:solidFill>
+                <a:srgbClr val="90C226"/>
+              </a:solidFill>
+              <a:effectLst/>
+              <a:uLnTx/>
+              <a:uFillTx/>
+              <a:latin typeface="Trebuchet MS" panose="020B0603020202020204"/>
+              <a:ea typeface="+mj-ea"/>
+              <a:cs typeface="+mj-cs"/>
+            </a:endParaRPr>
           </a:p>
         </p:txBody>
       </p:sp>

</xml_diff>